<commit_message>
Aggiornamenti delle immagini per la presentazione
</commit_message>
<xml_diff>
--- a/C Presentazioni/3 (10 01) Second Revision/Slides_Comet/Images_for_LaTEX.pptx
+++ b/C Presentazioni/3 (10 01) Second Revision/Slides_Comet/Images_for_LaTEX.pptx
@@ -9,7 +9,7 @@
     <p:sldId id="257" r:id="rId3"/>
     <p:sldId id="260" r:id="rId4"/>
     <p:sldId id="259" r:id="rId5"/>
-    <p:sldId id="261" r:id="rId6"/>
+    <p:sldId id="264" r:id="rId6"/>
     <p:sldId id="262" r:id="rId7"/>
     <p:sldId id="263" r:id="rId8"/>
   </p:sldIdLst>
@@ -267,7 +267,7 @@
           <a:p>
             <a:fld id="{29C8B44D-7814-C943-B351-EEBC30AE7DB2}" type="datetimeFigureOut">
               <a:rPr lang="en-IT" smtClean="0"/>
-              <a:t>28/12/2021</a:t>
+              <a:t>30/12/2021</a:t>
             </a:fld>
             <a:endParaRPr lang="en-IT"/>
           </a:p>
@@ -467,7 +467,7 @@
           <a:p>
             <a:fld id="{29C8B44D-7814-C943-B351-EEBC30AE7DB2}" type="datetimeFigureOut">
               <a:rPr lang="en-IT" smtClean="0"/>
-              <a:t>28/12/2021</a:t>
+              <a:t>30/12/2021</a:t>
             </a:fld>
             <a:endParaRPr lang="en-IT"/>
           </a:p>
@@ -677,7 +677,7 @@
           <a:p>
             <a:fld id="{29C8B44D-7814-C943-B351-EEBC30AE7DB2}" type="datetimeFigureOut">
               <a:rPr lang="en-IT" smtClean="0"/>
-              <a:t>28/12/2021</a:t>
+              <a:t>30/12/2021</a:t>
             </a:fld>
             <a:endParaRPr lang="en-IT"/>
           </a:p>
@@ -877,7 +877,7 @@
           <a:p>
             <a:fld id="{29C8B44D-7814-C943-B351-EEBC30AE7DB2}" type="datetimeFigureOut">
               <a:rPr lang="en-IT" smtClean="0"/>
-              <a:t>28/12/2021</a:t>
+              <a:t>30/12/2021</a:t>
             </a:fld>
             <a:endParaRPr lang="en-IT"/>
           </a:p>
@@ -1153,7 +1153,7 @@
           <a:p>
             <a:fld id="{29C8B44D-7814-C943-B351-EEBC30AE7DB2}" type="datetimeFigureOut">
               <a:rPr lang="en-IT" smtClean="0"/>
-              <a:t>28/12/2021</a:t>
+              <a:t>30/12/2021</a:t>
             </a:fld>
             <a:endParaRPr lang="en-IT"/>
           </a:p>
@@ -1421,7 +1421,7 @@
           <a:p>
             <a:fld id="{29C8B44D-7814-C943-B351-EEBC30AE7DB2}" type="datetimeFigureOut">
               <a:rPr lang="en-IT" smtClean="0"/>
-              <a:t>28/12/2021</a:t>
+              <a:t>30/12/2021</a:t>
             </a:fld>
             <a:endParaRPr lang="en-IT"/>
           </a:p>
@@ -1836,7 +1836,7 @@
           <a:p>
             <a:fld id="{29C8B44D-7814-C943-B351-EEBC30AE7DB2}" type="datetimeFigureOut">
               <a:rPr lang="en-IT" smtClean="0"/>
-              <a:t>28/12/2021</a:t>
+              <a:t>30/12/2021</a:t>
             </a:fld>
             <a:endParaRPr lang="en-IT"/>
           </a:p>
@@ -1978,7 +1978,7 @@
           <a:p>
             <a:fld id="{29C8B44D-7814-C943-B351-EEBC30AE7DB2}" type="datetimeFigureOut">
               <a:rPr lang="en-IT" smtClean="0"/>
-              <a:t>28/12/2021</a:t>
+              <a:t>30/12/2021</a:t>
             </a:fld>
             <a:endParaRPr lang="en-IT"/>
           </a:p>
@@ -2091,7 +2091,7 @@
           <a:p>
             <a:fld id="{29C8B44D-7814-C943-B351-EEBC30AE7DB2}" type="datetimeFigureOut">
               <a:rPr lang="en-IT" smtClean="0"/>
-              <a:t>28/12/2021</a:t>
+              <a:t>30/12/2021</a:t>
             </a:fld>
             <a:endParaRPr lang="en-IT"/>
           </a:p>
@@ -2404,7 +2404,7 @@
           <a:p>
             <a:fld id="{29C8B44D-7814-C943-B351-EEBC30AE7DB2}" type="datetimeFigureOut">
               <a:rPr lang="en-IT" smtClean="0"/>
-              <a:t>28/12/2021</a:t>
+              <a:t>30/12/2021</a:t>
             </a:fld>
             <a:endParaRPr lang="en-IT"/>
           </a:p>
@@ -2693,7 +2693,7 @@
           <a:p>
             <a:fld id="{29C8B44D-7814-C943-B351-EEBC30AE7DB2}" type="datetimeFigureOut">
               <a:rPr lang="en-IT" smtClean="0"/>
-              <a:t>28/12/2021</a:t>
+              <a:t>30/12/2021</a:t>
             </a:fld>
             <a:endParaRPr lang="en-IT"/>
           </a:p>
@@ -2936,7 +2936,7 @@
           <a:p>
             <a:fld id="{29C8B44D-7814-C943-B351-EEBC30AE7DB2}" type="datetimeFigureOut">
               <a:rPr lang="en-IT" smtClean="0"/>
-              <a:t>28/12/2021</a:t>
+              <a:t>30/12/2021</a:t>
             </a:fld>
             <a:endParaRPr lang="en-IT"/>
           </a:p>
@@ -4105,10 +4105,10 @@
       </p:sp>
       <p:grpSp>
         <p:nvGrpSpPr>
-          <p:cNvPr id="20" name="Group 19">
-            <a:extLst>
-              <a:ext uri="{FF2B5EF4-FFF2-40B4-BE49-F238E27FC236}">
-                <a16:creationId xmlns:a16="http://schemas.microsoft.com/office/drawing/2014/main" id="{046D3F97-D4CF-B14E-B68D-9952F5E035B4}"/>
+          <p:cNvPr id="2" name="Group 1">
+            <a:extLst>
+              <a:ext uri="{FF2B5EF4-FFF2-40B4-BE49-F238E27FC236}">
+                <a16:creationId xmlns:a16="http://schemas.microsoft.com/office/drawing/2014/main" id="{9FBB1055-A3C6-724B-AE42-DE75CACA0699}"/>
               </a:ext>
             </a:extLst>
           </p:cNvPr>
@@ -4117,10 +4117,10 @@
         </p:nvGrpSpPr>
         <p:grpSpPr>
           <a:xfrm>
-            <a:off x="673617" y="333413"/>
-            <a:ext cx="6931516" cy="6155255"/>
-            <a:chOff x="1980372" y="142772"/>
-            <a:chExt cx="6931516" cy="6155255"/>
+            <a:off x="423365" y="333413"/>
+            <a:ext cx="8568154" cy="6155255"/>
+            <a:chOff x="423365" y="333413"/>
+            <a:chExt cx="8568154" cy="6155255"/>
           </a:xfrm>
         </p:grpSpPr>
         <p:sp>
@@ -4137,8 +4137,8 @@
           </p:nvSpPr>
           <p:spPr>
             <a:xfrm>
-              <a:off x="1980372" y="142772"/>
-              <a:ext cx="6931516" cy="6155255"/>
+              <a:off x="423365" y="333413"/>
+              <a:ext cx="8568154" cy="6155255"/>
             </a:xfrm>
             <a:prstGeom prst="rect">
               <a:avLst/>
@@ -4202,7 +4202,7 @@
           </p:blipFill>
           <p:spPr>
             <a:xfrm>
-              <a:off x="2241841" y="142772"/>
+              <a:off x="935086" y="333413"/>
               <a:ext cx="4860758" cy="5787391"/>
             </a:xfrm>
             <a:prstGeom prst="rect">
@@ -4224,7 +4224,7 @@
           </p:nvSpPr>
           <p:spPr>
             <a:xfrm>
-              <a:off x="3020357" y="5928695"/>
+              <a:off x="1713602" y="6119336"/>
               <a:ext cx="479618" cy="369332"/>
             </a:xfrm>
             <a:prstGeom prst="rect">
@@ -4249,151 +4249,6 @@
             </a:p>
           </p:txBody>
         </p:sp>
-        <p:pic>
-          <p:nvPicPr>
-            <p:cNvPr id="8" name="Picture 7">
-              <a:extLst>
-                <a:ext uri="{FF2B5EF4-FFF2-40B4-BE49-F238E27FC236}">
-                  <a16:creationId xmlns:a16="http://schemas.microsoft.com/office/drawing/2014/main" id="{C433274F-43B3-5D49-9CB2-F2045DB90F23}"/>
-                </a:ext>
-              </a:extLst>
-            </p:cNvPr>
-            <p:cNvPicPr>
-              <a:picLocks noChangeAspect="1"/>
-            </p:cNvPicPr>
-            <p:nvPr/>
-          </p:nvPicPr>
-          <p:blipFill rotWithShape="1">
-            <a:blip r:embed="rId4"/>
-            <a:srcRect l="7590" t="38746" r="90082" b="57055"/>
-            <a:stretch/>
-          </p:blipFill>
-          <p:spPr>
-            <a:xfrm>
-              <a:off x="1980372" y="1824551"/>
-              <a:ext cx="255656" cy="345600"/>
-            </a:xfrm>
-            <a:prstGeom prst="rect">
-              <a:avLst/>
-            </a:prstGeom>
-          </p:spPr>
-        </p:pic>
-        <p:pic>
-          <p:nvPicPr>
-            <p:cNvPr id="9" name="Picture 8">
-              <a:extLst>
-                <a:ext uri="{FF2B5EF4-FFF2-40B4-BE49-F238E27FC236}">
-                  <a16:creationId xmlns:a16="http://schemas.microsoft.com/office/drawing/2014/main" id="{1716C3B7-C454-2E4B-AE16-98634A2E969F}"/>
-                </a:ext>
-              </a:extLst>
-            </p:cNvPr>
-            <p:cNvPicPr>
-              <a:picLocks noChangeAspect="1"/>
-            </p:cNvPicPr>
-            <p:nvPr/>
-          </p:nvPicPr>
-          <p:blipFill rotWithShape="1">
-            <a:blip r:embed="rId4"/>
-            <a:srcRect l="10220" t="38746" r="87988" b="57055"/>
-            <a:stretch/>
-          </p:blipFill>
-          <p:spPr>
-            <a:xfrm>
-              <a:off x="2009775" y="2576375"/>
-              <a:ext cx="196850" cy="345600"/>
-            </a:xfrm>
-            <a:prstGeom prst="rect">
-              <a:avLst/>
-            </a:prstGeom>
-          </p:spPr>
-        </p:pic>
-        <p:pic>
-          <p:nvPicPr>
-            <p:cNvPr id="10" name="Picture 9">
-              <a:extLst>
-                <a:ext uri="{FF2B5EF4-FFF2-40B4-BE49-F238E27FC236}">
-                  <a16:creationId xmlns:a16="http://schemas.microsoft.com/office/drawing/2014/main" id="{585870E7-BC52-F043-8041-23824A966594}"/>
-                </a:ext>
-              </a:extLst>
-            </p:cNvPr>
-            <p:cNvPicPr>
-              <a:picLocks noChangeAspect="1"/>
-            </p:cNvPicPr>
-            <p:nvPr/>
-          </p:nvPicPr>
-          <p:blipFill rotWithShape="1">
-            <a:blip r:embed="rId4"/>
-            <a:srcRect l="12417" t="38746" r="85502" b="57055"/>
-            <a:stretch/>
-          </p:blipFill>
-          <p:spPr>
-            <a:xfrm>
-              <a:off x="2007428" y="3209267"/>
-              <a:ext cx="228600" cy="345600"/>
-            </a:xfrm>
-            <a:prstGeom prst="rect">
-              <a:avLst/>
-            </a:prstGeom>
-          </p:spPr>
-        </p:pic>
-        <p:pic>
-          <p:nvPicPr>
-            <p:cNvPr id="11" name="Picture 10">
-              <a:extLst>
-                <a:ext uri="{FF2B5EF4-FFF2-40B4-BE49-F238E27FC236}">
-                  <a16:creationId xmlns:a16="http://schemas.microsoft.com/office/drawing/2014/main" id="{41A80B6E-14EA-AF42-9DB7-61C4E9B785EE}"/>
-                </a:ext>
-              </a:extLst>
-            </p:cNvPr>
-            <p:cNvPicPr>
-              <a:picLocks noChangeAspect="1"/>
-            </p:cNvPicPr>
-            <p:nvPr/>
-          </p:nvPicPr>
-          <p:blipFill rotWithShape="1">
-            <a:blip r:embed="rId4"/>
-            <a:srcRect l="14775" t="38746" r="82941" b="57055"/>
-            <a:stretch/>
-          </p:blipFill>
-          <p:spPr>
-            <a:xfrm>
-              <a:off x="1985202" y="3891951"/>
-              <a:ext cx="250826" cy="345600"/>
-            </a:xfrm>
-            <a:prstGeom prst="rect">
-              <a:avLst/>
-            </a:prstGeom>
-          </p:spPr>
-        </p:pic>
-        <p:pic>
-          <p:nvPicPr>
-            <p:cNvPr id="12" name="Picture 11">
-              <a:extLst>
-                <a:ext uri="{FF2B5EF4-FFF2-40B4-BE49-F238E27FC236}">
-                  <a16:creationId xmlns:a16="http://schemas.microsoft.com/office/drawing/2014/main" id="{40BF4724-DC97-2D42-873E-53665E735231}"/>
-                </a:ext>
-              </a:extLst>
-            </p:cNvPr>
-            <p:cNvPicPr>
-              <a:picLocks noChangeAspect="1"/>
-            </p:cNvPicPr>
-            <p:nvPr/>
-          </p:nvPicPr>
-          <p:blipFill rotWithShape="1">
-            <a:blip r:embed="rId4"/>
-            <a:srcRect l="17483" t="38746" r="66044" b="57055"/>
-            <a:stretch/>
-          </p:blipFill>
-          <p:spPr>
-            <a:xfrm>
-              <a:off x="7102599" y="2863667"/>
-              <a:ext cx="1809289" cy="345600"/>
-            </a:xfrm>
-            <a:prstGeom prst="rect">
-              <a:avLst/>
-            </a:prstGeom>
-          </p:spPr>
-        </p:pic>
         <p:sp>
           <p:nvSpPr>
             <p:cNvPr id="13" name="TextBox 12">
@@ -4408,7 +4263,7 @@
           </p:nvSpPr>
           <p:spPr>
             <a:xfrm>
-              <a:off x="3948322" y="5928695"/>
+              <a:off x="2641567" y="6119336"/>
               <a:ext cx="479618" cy="369332"/>
             </a:xfrm>
             <a:prstGeom prst="rect">
@@ -4447,7 +4302,7 @@
           </p:nvSpPr>
           <p:spPr>
             <a:xfrm>
-              <a:off x="4886475" y="5928695"/>
+              <a:off x="3579720" y="6119336"/>
               <a:ext cx="479618" cy="369332"/>
             </a:xfrm>
             <a:prstGeom prst="rect">
@@ -4486,7 +4341,7 @@
           </p:nvSpPr>
           <p:spPr>
             <a:xfrm>
-              <a:off x="5815054" y="5928695"/>
+              <a:off x="4508299" y="6119336"/>
               <a:ext cx="479618" cy="369332"/>
             </a:xfrm>
             <a:prstGeom prst="rect">
@@ -4525,7 +4380,7 @@
           </p:nvSpPr>
           <p:spPr>
             <a:xfrm>
-              <a:off x="6822767" y="5901436"/>
+              <a:off x="5516012" y="6092077"/>
               <a:ext cx="332142" cy="369332"/>
             </a:xfrm>
             <a:prstGeom prst="rect">
@@ -4564,7 +4419,7 @@
           </p:nvSpPr>
           <p:spPr>
             <a:xfrm>
-              <a:off x="2139709" y="5928695"/>
+              <a:off x="832954" y="6119336"/>
               <a:ext cx="332142" cy="369332"/>
             </a:xfrm>
             <a:prstGeom prst="rect">
@@ -4589,6 +4444,151 @@
             </a:p>
           </p:txBody>
         </p:sp>
+        <p:pic>
+          <p:nvPicPr>
+            <p:cNvPr id="22" name="Picture 21">
+              <a:extLst>
+                <a:ext uri="{FF2B5EF4-FFF2-40B4-BE49-F238E27FC236}">
+                  <a16:creationId xmlns:a16="http://schemas.microsoft.com/office/drawing/2014/main" id="{1F78A0AA-D14E-8C4A-8FA1-B84CE75A5EB6}"/>
+                </a:ext>
+              </a:extLst>
+            </p:cNvPr>
+            <p:cNvPicPr>
+              <a:picLocks noChangeAspect="1"/>
+            </p:cNvPicPr>
+            <p:nvPr/>
+          </p:nvPicPr>
+          <p:blipFill rotWithShape="1">
+            <a:blip r:embed="rId4"/>
+            <a:srcRect l="17491" t="38457" r="66043" b="57055"/>
+            <a:stretch/>
+          </p:blipFill>
+          <p:spPr>
+            <a:xfrm>
+              <a:off x="5731511" y="2894219"/>
+              <a:ext cx="3260008" cy="665777"/>
+            </a:xfrm>
+            <a:prstGeom prst="rect">
+              <a:avLst/>
+            </a:prstGeom>
+          </p:spPr>
+        </p:pic>
+        <p:pic>
+          <p:nvPicPr>
+            <p:cNvPr id="23" name="Picture 22">
+              <a:extLst>
+                <a:ext uri="{FF2B5EF4-FFF2-40B4-BE49-F238E27FC236}">
+                  <a16:creationId xmlns:a16="http://schemas.microsoft.com/office/drawing/2014/main" id="{E1AE6699-45B9-344E-85E5-389590E5705A}"/>
+                </a:ext>
+              </a:extLst>
+            </p:cNvPr>
+            <p:cNvPicPr>
+              <a:picLocks noChangeAspect="1"/>
+            </p:cNvPicPr>
+            <p:nvPr/>
+          </p:nvPicPr>
+          <p:blipFill rotWithShape="1">
+            <a:blip r:embed="rId4"/>
+            <a:srcRect l="14771" t="38457" r="83041" b="57055"/>
+            <a:stretch/>
+          </p:blipFill>
+          <p:spPr>
+            <a:xfrm>
+              <a:off x="449622" y="3866438"/>
+              <a:ext cx="433153" cy="665777"/>
+            </a:xfrm>
+            <a:prstGeom prst="rect">
+              <a:avLst/>
+            </a:prstGeom>
+          </p:spPr>
+        </p:pic>
+        <p:pic>
+          <p:nvPicPr>
+            <p:cNvPr id="24" name="Picture 23">
+              <a:extLst>
+                <a:ext uri="{FF2B5EF4-FFF2-40B4-BE49-F238E27FC236}">
+                  <a16:creationId xmlns:a16="http://schemas.microsoft.com/office/drawing/2014/main" id="{FB24710C-5B01-EB4F-94C4-59878CA5FB81}"/>
+                </a:ext>
+              </a:extLst>
+            </p:cNvPr>
+            <p:cNvPicPr>
+              <a:picLocks noChangeAspect="1"/>
+            </p:cNvPicPr>
+            <p:nvPr/>
+          </p:nvPicPr>
+          <p:blipFill rotWithShape="1">
+            <a:blip r:embed="rId4"/>
+            <a:srcRect l="12393" t="38457" r="85419" b="57055"/>
+            <a:stretch/>
+          </p:blipFill>
+          <p:spPr>
+            <a:xfrm>
+              <a:off x="449623" y="3211342"/>
+              <a:ext cx="433153" cy="665777"/>
+            </a:xfrm>
+            <a:prstGeom prst="rect">
+              <a:avLst/>
+            </a:prstGeom>
+          </p:spPr>
+        </p:pic>
+        <p:pic>
+          <p:nvPicPr>
+            <p:cNvPr id="25" name="Picture 24">
+              <a:extLst>
+                <a:ext uri="{FF2B5EF4-FFF2-40B4-BE49-F238E27FC236}">
+                  <a16:creationId xmlns:a16="http://schemas.microsoft.com/office/drawing/2014/main" id="{33825A46-88FD-C74C-9486-9A572C7ADC59}"/>
+                </a:ext>
+              </a:extLst>
+            </p:cNvPr>
+            <p:cNvPicPr>
+              <a:picLocks noChangeAspect="1"/>
+            </p:cNvPicPr>
+            <p:nvPr/>
+          </p:nvPicPr>
+          <p:blipFill rotWithShape="1">
+            <a:blip r:embed="rId4"/>
+            <a:srcRect l="9965" t="38457" r="87847" b="57055"/>
+            <a:stretch/>
+          </p:blipFill>
+          <p:spPr>
+            <a:xfrm>
+              <a:off x="461786" y="2595661"/>
+              <a:ext cx="433153" cy="665777"/>
+            </a:xfrm>
+            <a:prstGeom prst="rect">
+              <a:avLst/>
+            </a:prstGeom>
+          </p:spPr>
+        </p:pic>
+        <p:pic>
+          <p:nvPicPr>
+            <p:cNvPr id="26" name="Picture 25">
+              <a:extLst>
+                <a:ext uri="{FF2B5EF4-FFF2-40B4-BE49-F238E27FC236}">
+                  <a16:creationId xmlns:a16="http://schemas.microsoft.com/office/drawing/2014/main" id="{CAF2F975-8E0D-A44E-BCF5-9A45231F57EE}"/>
+                </a:ext>
+              </a:extLst>
+            </p:cNvPr>
+            <p:cNvPicPr>
+              <a:picLocks noChangeAspect="1"/>
+            </p:cNvPicPr>
+            <p:nvPr/>
+          </p:nvPicPr>
+          <p:blipFill rotWithShape="1">
+            <a:blip r:embed="rId4"/>
+            <a:srcRect l="7408" t="38457" r="90063" b="57055"/>
+            <a:stretch/>
+          </p:blipFill>
+          <p:spPr>
+            <a:xfrm>
+              <a:off x="423365" y="1835769"/>
+              <a:ext cx="500609" cy="665777"/>
+            </a:xfrm>
+            <a:prstGeom prst="rect">
+              <a:avLst/>
+            </a:prstGeom>
+          </p:spPr>
+        </p:pic>
       </p:grpSp>
       <p:sp>
         <p:nvSpPr>
@@ -4681,10 +4681,10 @@
         </p:nvGrpSpPr>
         <p:grpSpPr>
           <a:xfrm>
-            <a:off x="2125012" y="587597"/>
-            <a:ext cx="9208396" cy="4909078"/>
-            <a:chOff x="2125012" y="587597"/>
-            <a:chExt cx="9208396" cy="4909078"/>
+            <a:off x="2125012" y="495263"/>
+            <a:ext cx="9208396" cy="5001412"/>
+            <a:chOff x="2125012" y="495263"/>
+            <a:chExt cx="9208396" cy="5001412"/>
           </a:xfrm>
         </p:grpSpPr>
         <p:sp>
@@ -4701,8 +4701,8 @@
           </p:nvSpPr>
           <p:spPr>
             <a:xfrm>
-              <a:off x="2125012" y="587597"/>
-              <a:ext cx="9208395" cy="4909077"/>
+              <a:off x="2125012" y="495263"/>
+              <a:ext cx="9208395" cy="5001411"/>
             </a:xfrm>
             <a:prstGeom prst="rect">
               <a:avLst/>
@@ -4866,8 +4866,8 @@
           </p:nvSpPr>
           <p:spPr>
             <a:xfrm>
-              <a:off x="5879607" y="587597"/>
-              <a:ext cx="1716880" cy="369332"/>
+              <a:off x="5612560" y="495263"/>
+              <a:ext cx="2232984" cy="461665"/>
             </a:xfrm>
             <a:prstGeom prst="rect">
               <a:avLst/>
@@ -4881,7 +4881,7 @@
             <a:lstStyle/>
             <a:p>
               <a:r>
-                <a:rPr lang="en-IT" dirty="0">
+                <a:rPr lang="en-IT" sz="2400" dirty="0">
                   <a:latin typeface="DEJAVU SANS" panose="020B0603030804020204" pitchFamily="34" charset="0"/>
                   <a:ea typeface="DEJAVU SANS" panose="020B0603030804020204" pitchFamily="34" charset="0"/>
                   <a:cs typeface="DEJAVU SANS" panose="020B0603030804020204" pitchFamily="34" charset="0"/>
@@ -5000,10 +5000,10 @@
       </p:grpSpPr>
       <p:grpSp>
         <p:nvGrpSpPr>
-          <p:cNvPr id="10" name="Group 9">
-            <a:extLst>
-              <a:ext uri="{FF2B5EF4-FFF2-40B4-BE49-F238E27FC236}">
-                <a16:creationId xmlns:a16="http://schemas.microsoft.com/office/drawing/2014/main" id="{DC046DFC-D9C6-E14F-B591-DE7D7E6E0E4E}"/>
+          <p:cNvPr id="13" name="Group 12">
+            <a:extLst>
+              <a:ext uri="{FF2B5EF4-FFF2-40B4-BE49-F238E27FC236}">
+                <a16:creationId xmlns:a16="http://schemas.microsoft.com/office/drawing/2014/main" id="{A9A1A73C-FC17-AB4E-B104-C0B8D37BD370}"/>
               </a:ext>
             </a:extLst>
           </p:cNvPr>
@@ -5012,10 +5012,10 @@
         </p:nvGrpSpPr>
         <p:grpSpPr>
           <a:xfrm>
-            <a:off x="555552" y="1145828"/>
-            <a:ext cx="12427817" cy="3600824"/>
-            <a:chOff x="555552" y="1145828"/>
-            <a:chExt cx="12427817" cy="3600824"/>
+            <a:off x="410403" y="1068308"/>
+            <a:ext cx="12579668" cy="3677520"/>
+            <a:chOff x="410403" y="1068308"/>
+            <a:chExt cx="12579668" cy="3677520"/>
           </a:xfrm>
         </p:grpSpPr>
         <p:sp>
@@ -5032,8 +5032,8 @@
           </p:nvSpPr>
           <p:spPr>
             <a:xfrm>
-              <a:off x="555552" y="1145828"/>
-              <a:ext cx="12427817" cy="3600000"/>
+              <a:off x="410404" y="1068308"/>
+              <a:ext cx="12572966" cy="3677520"/>
             </a:xfrm>
             <a:prstGeom prst="rect">
               <a:avLst/>
@@ -5072,10 +5072,10 @@
         </p:sp>
         <p:pic>
           <p:nvPicPr>
-            <p:cNvPr id="5" name="Picture 4" descr="Chart&#10;&#10;Description automatically generated">
+            <p:cNvPr id="6" name="Picture 5" descr="Diagram&#10;&#10;Description automatically generated">
               <a:extLst>
                 <a:ext uri="{FF2B5EF4-FFF2-40B4-BE49-F238E27FC236}">
-                  <a16:creationId xmlns:a16="http://schemas.microsoft.com/office/drawing/2014/main" id="{426E64F3-FE4B-3944-B285-FB7797602B14}"/>
+                  <a16:creationId xmlns:a16="http://schemas.microsoft.com/office/drawing/2014/main" id="{04BCEB9D-88AB-2A43-985E-38BDA8ECD46B}"/>
                 </a:ext>
               </a:extLst>
             </p:cNvPr>
@@ -5085,15 +5085,17 @@
             <p:nvPr/>
           </p:nvPicPr>
           <p:blipFill>
-            <a:blip r:embed="rId2"/>
+            <a:blip r:embed="rId2">
+              <a:alphaModFix/>
+            </a:blip>
             <a:stretch>
               <a:fillRect/>
             </a:stretch>
           </p:blipFill>
           <p:spPr>
             <a:xfrm>
-              <a:off x="555552" y="1145828"/>
-              <a:ext cx="3995122" cy="3600000"/>
+              <a:off x="410403" y="1068308"/>
+              <a:ext cx="5037904" cy="3677520"/>
             </a:xfrm>
             <a:prstGeom prst="rect">
               <a:avLst/>
@@ -5102,10 +5104,10 @@
         </p:pic>
         <p:pic>
           <p:nvPicPr>
-            <p:cNvPr id="7" name="Picture 6" descr="Chart&#10;&#10;Description automatically generated">
+            <p:cNvPr id="3" name="Picture 2" descr="Chart&#10;&#10;Description automatically generated">
               <a:extLst>
                 <a:ext uri="{FF2B5EF4-FFF2-40B4-BE49-F238E27FC236}">
-                  <a16:creationId xmlns:a16="http://schemas.microsoft.com/office/drawing/2014/main" id="{BE74ED07-67B1-CA4C-AC28-E13725246F7B}"/>
+                  <a16:creationId xmlns:a16="http://schemas.microsoft.com/office/drawing/2014/main" id="{BBCC1A78-3BBD-1E4C-8590-E1214EBBFCD5}"/>
                 </a:ext>
               </a:extLst>
             </p:cNvPr>
@@ -5115,15 +5117,17 @@
             <p:nvPr/>
           </p:nvPicPr>
           <p:blipFill>
-            <a:blip r:embed="rId3"/>
+            <a:blip r:embed="rId3">
+              <a:alphaModFix/>
+            </a:blip>
             <a:stretch>
               <a:fillRect/>
             </a:stretch>
           </p:blipFill>
           <p:spPr>
             <a:xfrm>
-              <a:off x="6281831" y="1146652"/>
-              <a:ext cx="6701538" cy="3600000"/>
+              <a:off x="6281831" y="1068308"/>
+              <a:ext cx="6708240" cy="3677520"/>
             </a:xfrm>
             <a:prstGeom prst="rect">
               <a:avLst/>
@@ -5181,7 +5185,7 @@
     </p:spTree>
     <p:extLst>
       <p:ext uri="{BB962C8B-B14F-4D97-AF65-F5344CB8AC3E}">
-        <p14:creationId xmlns:p14="http://schemas.microsoft.com/office/powerpoint/2010/main" val="2516128521"/>
+        <p14:creationId xmlns:p14="http://schemas.microsoft.com/office/powerpoint/2010/main" val="2489897253"/>
       </p:ext>
     </p:extLst>
   </p:cSld>
@@ -6064,10 +6068,10 @@
       </p:grpSpPr>
       <p:grpSp>
         <p:nvGrpSpPr>
-          <p:cNvPr id="10" name="Group 9">
-            <a:extLst>
-              <a:ext uri="{FF2B5EF4-FFF2-40B4-BE49-F238E27FC236}">
-                <a16:creationId xmlns:a16="http://schemas.microsoft.com/office/drawing/2014/main" id="{CE7522D1-0B41-2C44-9F53-DB211BEFD38E}"/>
+          <p:cNvPr id="2" name="Group 1">
+            <a:extLst>
+              <a:ext uri="{FF2B5EF4-FFF2-40B4-BE49-F238E27FC236}">
+                <a16:creationId xmlns:a16="http://schemas.microsoft.com/office/drawing/2014/main" id="{AE9ECDDE-2B7C-174A-A277-654AA553272F}"/>
               </a:ext>
             </a:extLst>
           </p:cNvPr>
@@ -6076,10 +6080,10 @@
         </p:nvGrpSpPr>
         <p:grpSpPr>
           <a:xfrm>
-            <a:off x="504533" y="1651000"/>
-            <a:ext cx="11039766" cy="3556001"/>
-            <a:chOff x="504533" y="1651000"/>
-            <a:chExt cx="11039766" cy="3556001"/>
+            <a:off x="6096000" y="-126998"/>
+            <a:ext cx="5384800" cy="7111998"/>
+            <a:chOff x="6096000" y="-126998"/>
+            <a:chExt cx="5384800" cy="7111998"/>
           </a:xfrm>
         </p:grpSpPr>
         <p:sp>
@@ -6096,8 +6100,8 @@
           </p:nvSpPr>
           <p:spPr>
             <a:xfrm>
-              <a:off x="504533" y="1651001"/>
-              <a:ext cx="11039766" cy="3556000"/>
+              <a:off x="6096000" y="-126998"/>
+              <a:ext cx="5384800" cy="7111998"/>
             </a:xfrm>
             <a:prstGeom prst="rect">
               <a:avLst/>
@@ -6158,7 +6162,7 @@
           </p:blipFill>
           <p:spPr>
             <a:xfrm>
-              <a:off x="6159499" y="1651000"/>
+              <a:off x="6096000" y="3429000"/>
               <a:ext cx="5384800" cy="3556000"/>
             </a:xfrm>
             <a:prstGeom prst="rect">
@@ -6188,7 +6192,7 @@
           </p:blipFill>
           <p:spPr>
             <a:xfrm>
-              <a:off x="504533" y="1651000"/>
+              <a:off x="6096000" y="-126998"/>
               <a:ext cx="5384800" cy="3556000"/>
             </a:xfrm>
             <a:prstGeom prst="rect">
@@ -6211,7 +6215,7 @@
         </p:nvSpPr>
         <p:spPr>
           <a:xfrm>
-            <a:off x="4356189" y="6176897"/>
+            <a:off x="1537833" y="6001533"/>
             <a:ext cx="2526013" cy="369332"/>
           </a:xfrm>
           <a:prstGeom prst="rect">

</xml_diff>